<commit_message>
xgboost update, ppt screenshots added
</commit_message>
<xml_diff>
--- a/ALY6160GroupFINAL.pptx
+++ b/ALY6160GroupFINAL.pptx
@@ -5,7 +5,7 @@
     <p:sldMasterId id="2147483648" r:id="rId1"/>
   </p:sldMasterIdLst>
   <p:notesMasterIdLst>
-    <p:notesMasterId r:id="rId20"/>
+    <p:notesMasterId r:id="rId22"/>
   </p:notesMasterIdLst>
   <p:sldIdLst>
     <p:sldId id="264" r:id="rId2"/>
@@ -20,12 +20,14 @@
     <p:sldId id="259" r:id="rId11"/>
     <p:sldId id="268" r:id="rId12"/>
     <p:sldId id="273" r:id="rId13"/>
-    <p:sldId id="265" r:id="rId14"/>
-    <p:sldId id="269" r:id="rId15"/>
-    <p:sldId id="274" r:id="rId16"/>
-    <p:sldId id="261" r:id="rId17"/>
-    <p:sldId id="262" r:id="rId18"/>
-    <p:sldId id="263" r:id="rId19"/>
+    <p:sldId id="275" r:id="rId14"/>
+    <p:sldId id="276" r:id="rId15"/>
+    <p:sldId id="265" r:id="rId16"/>
+    <p:sldId id="269" r:id="rId17"/>
+    <p:sldId id="274" r:id="rId18"/>
+    <p:sldId id="261" r:id="rId19"/>
+    <p:sldId id="262" r:id="rId20"/>
+    <p:sldId id="263" r:id="rId21"/>
   </p:sldIdLst>
   <p:sldSz cx="12192000" cy="6858000"/>
   <p:notesSz cx="6858000" cy="9144000"/>
@@ -149,6 +151,8 @@
           <p14:sldIdLst>
             <p14:sldId id="268"/>
             <p14:sldId id="273"/>
+            <p14:sldId id="275"/>
+            <p14:sldId id="276"/>
             <p14:sldId id="265"/>
             <p14:sldId id="269"/>
             <p14:sldId id="274"/>
@@ -518,7 +522,7 @@
             <a:fld id="{80180EA8-2363-6546-9295-3AB8E8213896}" type="datetimeFigureOut">
               <a:rPr lang="en-US" smtClean="0"/>
               <a:pPr/>
-              <a:t>2/21/21</a:t>
+              <a:t>2/23/21</a:t>
             </a:fld>
             <a:endParaRPr lang="en-US"/>
           </a:p>
@@ -1032,7 +1036,7 @@
             <a:fld id="{05D96418-AAE0-0248-8664-955F16523268}" type="slidenum">
               <a:rPr lang="en-US" smtClean="0"/>
               <a:pPr/>
-              <a:t>15</a:t>
+              <a:t>17</a:t>
             </a:fld>
             <a:endParaRPr lang="en-US"/>
           </a:p>
@@ -1120,7 +1124,7 @@
             <a:fld id="{05D96418-AAE0-0248-8664-955F16523268}" type="slidenum">
               <a:rPr lang="en-US" smtClean="0"/>
               <a:pPr/>
-              <a:t>16</a:t>
+              <a:t>18</a:t>
             </a:fld>
             <a:endParaRPr lang="en-US"/>
           </a:p>
@@ -1214,7 +1218,7 @@
             <a:fld id="{05D96418-AAE0-0248-8664-955F16523268}" type="slidenum">
               <a:rPr lang="en-US" smtClean="0"/>
               <a:pPr/>
-              <a:t>17</a:t>
+              <a:t>19</a:t>
             </a:fld>
             <a:endParaRPr lang="en-US"/>
           </a:p>
@@ -1316,7 +1320,7 @@
             <a:fld id="{05D96418-AAE0-0248-8664-955F16523268}" type="slidenum">
               <a:rPr lang="en-US" smtClean="0"/>
               <a:pPr/>
-              <a:t>18</a:t>
+              <a:t>20</a:t>
             </a:fld>
             <a:endParaRPr lang="en-US"/>
           </a:p>
@@ -1380,31 +1384,31 @@
           <a:lstStyle/>
           <a:p>
             <a:r>
-              <a:rPr lang="en-US"/>
+              <a:rPr lang="en-US" dirty="0"/>
               <a:t>MCBS PUF (public use file) variables : </a:t>
             </a:r>
           </a:p>
           <a:p>
             <a:r>
-              <a:rPr lang="en-US"/>
+              <a:rPr lang="en-US" dirty="0"/>
               <a:t>Total 673  - Although not all available for Fall, Winter and Summer = 239 variables</a:t>
             </a:r>
           </a:p>
           <a:p>
             <a:r>
-              <a:rPr lang="en-US"/>
+              <a:rPr lang="en-US" dirty="0"/>
               <a:t>Randomly generated IDs to protect identity of patients - but also prevent multi-year time series analyses</a:t>
             </a:r>
           </a:p>
           <a:p>
             <a:r>
-              <a:rPr lang="en-US"/>
+              <a:rPr lang="en-US" dirty="0"/>
               <a:t>No Geographic identifiers</a:t>
             </a:r>
           </a:p>
           <a:p>
             <a:r>
-              <a:rPr lang="en-US"/>
+              <a:rPr lang="en-US" dirty="0"/>
               <a:t>Populations Weights</a:t>
             </a:r>
           </a:p>
@@ -2119,7 +2123,7 @@
             <a:fld id="{05D96418-AAE0-0248-8664-955F16523268}" type="slidenum">
               <a:rPr lang="en-US" smtClean="0"/>
               <a:pPr/>
-              <a:t>14</a:t>
+              <a:t>16</a:t>
             </a:fld>
             <a:endParaRPr lang="en-US"/>
           </a:p>
@@ -2285,7 +2289,7 @@
           <a:p>
             <a:fld id="{013BFEAD-1BEF-244B-B3CC-6137F4E9A449}" type="datetimeFigureOut">
               <a:rPr lang="en-US" smtClean="0"/>
-              <a:t>2/21/21</a:t>
+              <a:t>2/23/21</a:t>
             </a:fld>
             <a:endParaRPr lang="en-US"/>
           </a:p>
@@ -2483,7 +2487,7 @@
           <a:p>
             <a:fld id="{013BFEAD-1BEF-244B-B3CC-6137F4E9A449}" type="datetimeFigureOut">
               <a:rPr lang="en-US" smtClean="0"/>
-              <a:t>2/21/21</a:t>
+              <a:t>2/23/21</a:t>
             </a:fld>
             <a:endParaRPr lang="en-US"/>
           </a:p>
@@ -2691,7 +2695,7 @@
           <a:p>
             <a:fld id="{013BFEAD-1BEF-244B-B3CC-6137F4E9A449}" type="datetimeFigureOut">
               <a:rPr lang="en-US" smtClean="0"/>
-              <a:t>2/21/21</a:t>
+              <a:t>2/23/21</a:t>
             </a:fld>
             <a:endParaRPr lang="en-US"/>
           </a:p>
@@ -2889,7 +2893,7 @@
           <a:p>
             <a:fld id="{013BFEAD-1BEF-244B-B3CC-6137F4E9A449}" type="datetimeFigureOut">
               <a:rPr lang="en-US" smtClean="0"/>
-              <a:t>2/21/21</a:t>
+              <a:t>2/23/21</a:t>
             </a:fld>
             <a:endParaRPr lang="en-US"/>
           </a:p>
@@ -3164,7 +3168,7 @@
           <a:p>
             <a:fld id="{013BFEAD-1BEF-244B-B3CC-6137F4E9A449}" type="datetimeFigureOut">
               <a:rPr lang="en-US" smtClean="0"/>
-              <a:t>2/21/21</a:t>
+              <a:t>2/23/21</a:t>
             </a:fld>
             <a:endParaRPr lang="en-US"/>
           </a:p>
@@ -3429,7 +3433,7 @@
           <a:p>
             <a:fld id="{013BFEAD-1BEF-244B-B3CC-6137F4E9A449}" type="datetimeFigureOut">
               <a:rPr lang="en-US" smtClean="0"/>
-              <a:t>2/21/21</a:t>
+              <a:t>2/23/21</a:t>
             </a:fld>
             <a:endParaRPr lang="en-US"/>
           </a:p>
@@ -3841,7 +3845,7 @@
           <a:p>
             <a:fld id="{013BFEAD-1BEF-244B-B3CC-6137F4E9A449}" type="datetimeFigureOut">
               <a:rPr lang="en-US" smtClean="0"/>
-              <a:t>2/21/21</a:t>
+              <a:t>2/23/21</a:t>
             </a:fld>
             <a:endParaRPr lang="en-US"/>
           </a:p>
@@ -3982,7 +3986,7 @@
           <a:p>
             <a:fld id="{013BFEAD-1BEF-244B-B3CC-6137F4E9A449}" type="datetimeFigureOut">
               <a:rPr lang="en-US" smtClean="0"/>
-              <a:t>2/21/21</a:t>
+              <a:t>2/23/21</a:t>
             </a:fld>
             <a:endParaRPr lang="en-US"/>
           </a:p>
@@ -4095,7 +4099,7 @@
           <a:p>
             <a:fld id="{013BFEAD-1BEF-244B-B3CC-6137F4E9A449}" type="datetimeFigureOut">
               <a:rPr lang="en-US" smtClean="0"/>
-              <a:t>2/21/21</a:t>
+              <a:t>2/23/21</a:t>
             </a:fld>
             <a:endParaRPr lang="en-US"/>
           </a:p>
@@ -4406,7 +4410,7 @@
           <a:p>
             <a:fld id="{013BFEAD-1BEF-244B-B3CC-6137F4E9A449}" type="datetimeFigureOut">
               <a:rPr lang="en-US" smtClean="0"/>
-              <a:t>2/21/21</a:t>
+              <a:t>2/23/21</a:t>
             </a:fld>
             <a:endParaRPr lang="en-US"/>
           </a:p>
@@ -4694,7 +4698,7 @@
           <a:p>
             <a:fld id="{013BFEAD-1BEF-244B-B3CC-6137F4E9A449}" type="datetimeFigureOut">
               <a:rPr lang="en-US" smtClean="0"/>
-              <a:t>2/21/21</a:t>
+              <a:t>2/23/21</a:t>
             </a:fld>
             <a:endParaRPr lang="en-US"/>
           </a:p>
@@ -4937,7 +4941,7 @@
             <a:fld id="{013BFEAD-1BEF-244B-B3CC-6137F4E9A449}" type="datetimeFigureOut">
               <a:rPr lang="en-US" smtClean="0"/>
               <a:pPr/>
-              <a:t>2/21/21</a:t>
+              <a:t>2/23/21</a:t>
             </a:fld>
             <a:endParaRPr lang="en-US"/>
           </a:p>
@@ -7851,6 +7855,182 @@
       </p:grpSpPr>
       <p:sp>
         <p:nvSpPr>
+          <p:cNvPr id="2" name="Title 1">
+            <a:extLst>
+              <a:ext uri="{FF2B5EF4-FFF2-40B4-BE49-F238E27FC236}">
+                <a16:creationId xmlns:a16="http://schemas.microsoft.com/office/drawing/2014/main" id="{4E9613BB-E8AF-1044-8934-9630A84C0395}"/>
+              </a:ext>
+            </a:extLst>
+          </p:cNvPr>
+          <p:cNvSpPr>
+            <a:spLocks noGrp="1"/>
+          </p:cNvSpPr>
+          <p:nvPr>
+            <p:ph type="title"/>
+          </p:nvPr>
+        </p:nvSpPr>
+        <p:spPr/>
+        <p:txBody>
+          <a:bodyPr/>
+          <a:lstStyle/>
+          <a:p>
+            <a:r>
+              <a:rPr lang="en-US" dirty="0"/>
+              <a:t>XGBoost Model</a:t>
+            </a:r>
+          </a:p>
+        </p:txBody>
+      </p:sp>
+      <p:sp>
+        <p:nvSpPr>
+          <p:cNvPr id="3" name="Content Placeholder 2">
+            <a:extLst>
+              <a:ext uri="{FF2B5EF4-FFF2-40B4-BE49-F238E27FC236}">
+                <a16:creationId xmlns:a16="http://schemas.microsoft.com/office/drawing/2014/main" id="{ED5141AA-CF96-E347-AE54-8750BBFE3642}"/>
+              </a:ext>
+            </a:extLst>
+          </p:cNvPr>
+          <p:cNvSpPr>
+            <a:spLocks noGrp="1"/>
+          </p:cNvSpPr>
+          <p:nvPr>
+            <p:ph idx="1"/>
+          </p:nvPr>
+        </p:nvSpPr>
+        <p:spPr/>
+        <p:txBody>
+          <a:bodyPr/>
+          <a:lstStyle/>
+          <a:p>
+            <a:endParaRPr lang="en-US"/>
+          </a:p>
+        </p:txBody>
+      </p:sp>
+    </p:spTree>
+    <p:extLst>
+      <p:ext uri="{BB962C8B-B14F-4D97-AF65-F5344CB8AC3E}">
+        <p14:creationId xmlns:p14="http://schemas.microsoft.com/office/powerpoint/2010/main" val="18254828"/>
+      </p:ext>
+    </p:extLst>
+  </p:cSld>
+  <p:clrMapOvr>
+    <a:masterClrMapping/>
+  </p:clrMapOvr>
+</p:sld>
+</file>
+
+<file path=ppt/slides/slide14.xml><?xml version="1.0" encoding="utf-8"?>
+<p:sld xmlns:a="http://schemas.openxmlformats.org/drawingml/2006/main" xmlns:r="http://schemas.openxmlformats.org/officeDocument/2006/relationships" xmlns:p="http://schemas.openxmlformats.org/presentationml/2006/main">
+  <p:cSld>
+    <p:spTree>
+      <p:nvGrpSpPr>
+        <p:cNvPr id="1" name=""/>
+        <p:cNvGrpSpPr/>
+        <p:nvPr/>
+      </p:nvGrpSpPr>
+      <p:grpSpPr>
+        <a:xfrm>
+          <a:off x="0" y="0"/>
+          <a:ext cx="0" cy="0"/>
+          <a:chOff x="0" y="0"/>
+          <a:chExt cx="0" cy="0"/>
+        </a:xfrm>
+      </p:grpSpPr>
+      <p:sp>
+        <p:nvSpPr>
+          <p:cNvPr id="2" name="Title 1">
+            <a:extLst>
+              <a:ext uri="{FF2B5EF4-FFF2-40B4-BE49-F238E27FC236}">
+                <a16:creationId xmlns:a16="http://schemas.microsoft.com/office/drawing/2014/main" id="{838E7910-1AE3-BF41-B625-BF6423C5E3DA}"/>
+              </a:ext>
+            </a:extLst>
+          </p:cNvPr>
+          <p:cNvSpPr>
+            <a:spLocks noGrp="1"/>
+          </p:cNvSpPr>
+          <p:nvPr>
+            <p:ph type="title"/>
+          </p:nvPr>
+        </p:nvSpPr>
+        <p:spPr>
+          <a:xfrm>
+            <a:off x="838200" y="186209"/>
+            <a:ext cx="10515600" cy="1325563"/>
+          </a:xfrm>
+        </p:spPr>
+        <p:txBody>
+          <a:bodyPr/>
+          <a:lstStyle/>
+          <a:p>
+            <a:pPr algn="ctr"/>
+            <a:r>
+              <a:rPr lang="en-US" dirty="0"/>
+              <a:t>Feature Importance</a:t>
+            </a:r>
+          </a:p>
+        </p:txBody>
+      </p:sp>
+      <p:pic>
+        <p:nvPicPr>
+          <p:cNvPr id="4" name="Picture 3">
+            <a:extLst>
+              <a:ext uri="{FF2B5EF4-FFF2-40B4-BE49-F238E27FC236}">
+                <a16:creationId xmlns:a16="http://schemas.microsoft.com/office/drawing/2014/main" id="{9A354B23-1587-EA47-8BD5-F0D9495D0572}"/>
+              </a:ext>
+            </a:extLst>
+          </p:cNvPr>
+          <p:cNvPicPr>
+            <a:picLocks noChangeAspect="1"/>
+          </p:cNvPicPr>
+          <p:nvPr/>
+        </p:nvPicPr>
+        <p:blipFill rotWithShape="1">
+          <a:blip r:embed="rId2"/>
+          <a:srcRect l="741" r="1295" b="1757"/>
+          <a:stretch/>
+        </p:blipFill>
+        <p:spPr>
+          <a:xfrm>
+            <a:off x="1979112" y="1273777"/>
+            <a:ext cx="8417492" cy="5252283"/>
+          </a:xfrm>
+          <a:prstGeom prst="rect">
+            <a:avLst/>
+          </a:prstGeom>
+        </p:spPr>
+      </p:pic>
+    </p:spTree>
+    <p:extLst>
+      <p:ext uri="{BB962C8B-B14F-4D97-AF65-F5344CB8AC3E}">
+        <p14:creationId xmlns:p14="http://schemas.microsoft.com/office/powerpoint/2010/main" val="3949254343"/>
+      </p:ext>
+    </p:extLst>
+  </p:cSld>
+  <p:clrMapOvr>
+    <a:masterClrMapping/>
+  </p:clrMapOvr>
+</p:sld>
+</file>
+
+<file path=ppt/slides/slide15.xml><?xml version="1.0" encoding="utf-8"?>
+<p:sld xmlns:a="http://schemas.openxmlformats.org/drawingml/2006/main" xmlns:r="http://schemas.openxmlformats.org/officeDocument/2006/relationships" xmlns:p="http://schemas.openxmlformats.org/presentationml/2006/main">
+  <p:cSld>
+    <p:spTree>
+      <p:nvGrpSpPr>
+        <p:cNvPr id="1" name=""/>
+        <p:cNvGrpSpPr/>
+        <p:nvPr/>
+      </p:nvGrpSpPr>
+      <p:grpSpPr>
+        <a:xfrm>
+          <a:off x="0" y="0"/>
+          <a:ext cx="0" cy="0"/>
+          <a:chOff x="0" y="0"/>
+          <a:chExt cx="0" cy="0"/>
+        </a:xfrm>
+      </p:grpSpPr>
+      <p:sp>
+        <p:nvSpPr>
           <p:cNvPr id="5" name="Title 4">
             <a:extLst>
               <a:ext uri="{FF2B5EF4-FFF2-40B4-BE49-F238E27FC236}">
@@ -7936,7 +8116,7 @@
 </p:sld>
 </file>
 
-<file path=ppt/slides/slide14.xml><?xml version="1.0" encoding="utf-8"?>
+<file path=ppt/slides/slide16.xml><?xml version="1.0" encoding="utf-8"?>
 <p:sld xmlns:a="http://schemas.openxmlformats.org/drawingml/2006/main" xmlns:r="http://schemas.openxmlformats.org/officeDocument/2006/relationships" xmlns:p="http://schemas.openxmlformats.org/presentationml/2006/main">
   <p:cSld>
     <p:bg>
@@ -8389,7 +8569,7 @@
 </p:sld>
 </file>
 
-<file path=ppt/slides/slide15.xml><?xml version="1.0" encoding="utf-8"?>
+<file path=ppt/slides/slide17.xml><?xml version="1.0" encoding="utf-8"?>
 <p:sld xmlns:a="http://schemas.openxmlformats.org/drawingml/2006/main" xmlns:r="http://schemas.openxmlformats.org/officeDocument/2006/relationships" xmlns:p="http://schemas.openxmlformats.org/presentationml/2006/main">
   <p:cSld>
     <p:bg>
@@ -8891,7 +9071,7 @@
 </p:sld>
 </file>
 
-<file path=ppt/slides/slide16.xml><?xml version="1.0" encoding="utf-8"?>
+<file path=ppt/slides/slide18.xml><?xml version="1.0" encoding="utf-8"?>
 <p:sld xmlns:a="http://schemas.openxmlformats.org/drawingml/2006/main" xmlns:r="http://schemas.openxmlformats.org/officeDocument/2006/relationships" xmlns:p="http://schemas.openxmlformats.org/presentationml/2006/main">
   <p:cSld>
     <p:spTree>
@@ -9373,7 +9553,7 @@
 </p:sld>
 </file>
 
-<file path=ppt/slides/slide17.xml><?xml version="1.0" encoding="utf-8"?>
+<file path=ppt/slides/slide19.xml><?xml version="1.0" encoding="utf-8"?>
 <p:sld xmlns:a="http://schemas.openxmlformats.org/drawingml/2006/main" xmlns:r="http://schemas.openxmlformats.org/officeDocument/2006/relationships" xmlns:p="http://schemas.openxmlformats.org/presentationml/2006/main">
   <p:cSld>
     <p:bg>
@@ -10063,494 +10243,6 @@
     <p:extLst>
       <p:ext uri="{BB962C8B-B14F-4D97-AF65-F5344CB8AC3E}">
         <p14:creationId xmlns:p14="http://schemas.microsoft.com/office/powerpoint/2010/main" val="162178625"/>
-      </p:ext>
-    </p:extLst>
-  </p:cSld>
-  <p:clrMapOvr>
-    <a:masterClrMapping/>
-  </p:clrMapOvr>
-</p:sld>
-</file>
-
-<file path=ppt/slides/slide18.xml><?xml version="1.0" encoding="utf-8"?>
-<p:sld xmlns:a="http://schemas.openxmlformats.org/drawingml/2006/main" xmlns:r="http://schemas.openxmlformats.org/officeDocument/2006/relationships" xmlns:p="http://schemas.openxmlformats.org/presentationml/2006/main">
-  <p:cSld>
-    <p:bg>
-      <p:bgPr>
-        <a:solidFill>
-          <a:schemeClr val="bg1"/>
-        </a:solidFill>
-        <a:effectLst/>
-      </p:bgPr>
-    </p:bg>
-    <p:spTree>
-      <p:nvGrpSpPr>
-        <p:cNvPr id="1" name=""/>
-        <p:cNvGrpSpPr/>
-        <p:nvPr/>
-      </p:nvGrpSpPr>
-      <p:grpSpPr>
-        <a:xfrm>
-          <a:off x="0" y="0"/>
-          <a:ext cx="0" cy="0"/>
-          <a:chOff x="0" y="0"/>
-          <a:chExt cx="0" cy="0"/>
-        </a:xfrm>
-      </p:grpSpPr>
-      <p:sp useBgFill="1">
-        <p:nvSpPr>
-          <p:cNvPr id="17" name="Rectangle 7">
-            <a:extLst>
-              <a:ext uri="{FF2B5EF4-FFF2-40B4-BE49-F238E27FC236}">
-                <a16:creationId xmlns:a16="http://schemas.microsoft.com/office/drawing/2014/main" id="{A7895A40-19A4-42D6-9D30-DBC1E8002635}"/>
-              </a:ext>
-              <a:ext uri="{C183D7F6-B498-43B3-948B-1728B52AA6E4}">
-                <adec:decorative xmlns:adec="http://schemas.microsoft.com/office/drawing/2017/decorative" val="1"/>
-              </a:ext>
-            </a:extLst>
-          </p:cNvPr>
-          <p:cNvSpPr>
-            <a:spLocks noGrp="1" noRot="1" noChangeAspect="1" noMove="1" noResize="1" noEditPoints="1" noAdjustHandles="1" noChangeArrowheads="1" noChangeShapeType="1" noTextEdit="1"/>
-          </p:cNvSpPr>
-          <p:nvPr>
-            <p:extLst>
-              <p:ext uri="{386F3935-93C4-4BCD-93E2-E3B085C9AB24}">
-                <p16:designElem xmlns:p16="http://schemas.microsoft.com/office/powerpoint/2015/main" val="1"/>
-              </p:ext>
-            </p:extLst>
-          </p:nvPr>
-        </p:nvSpPr>
-        <p:spPr>
-          <a:xfrm>
-            <a:off x="0" y="0"/>
-            <a:ext cx="12191999" cy="6857365"/>
-          </a:xfrm>
-          <a:prstGeom prst="rect">
-            <a:avLst/>
-          </a:prstGeom>
-          <a:ln>
-            <a:noFill/>
-          </a:ln>
-        </p:spPr>
-        <p:style>
-          <a:lnRef idx="2">
-            <a:schemeClr val="accent1">
-              <a:shade val="50000"/>
-            </a:schemeClr>
-          </a:lnRef>
-          <a:fillRef idx="1">
-            <a:schemeClr val="accent1"/>
-          </a:fillRef>
-          <a:effectRef idx="0">
-            <a:schemeClr val="accent1"/>
-          </a:effectRef>
-          <a:fontRef idx="minor">
-            <a:schemeClr val="lt1"/>
-          </a:fontRef>
-        </p:style>
-        <p:txBody>
-          <a:bodyPr rtlCol="0" anchor="ctr"/>
-          <a:lstStyle/>
-          <a:p>
-            <a:pPr algn="ctr"/>
-            <a:endParaRPr lang="en-US">
-              <a:latin typeface="Avenir Book" panose="02000503020000020003" pitchFamily="2" charset="0"/>
-            </a:endParaRPr>
-          </a:p>
-        </p:txBody>
-      </p:sp>
-      <p:sp>
-        <p:nvSpPr>
-          <p:cNvPr id="18" name="Rectangle 9">
-            <a:extLst>
-              <a:ext uri="{FF2B5EF4-FFF2-40B4-BE49-F238E27FC236}">
-                <a16:creationId xmlns:a16="http://schemas.microsoft.com/office/drawing/2014/main" id="{02F429C4-ABC9-46FC-818A-B5429CDE4A96}"/>
-              </a:ext>
-              <a:ext uri="{C183D7F6-B498-43B3-948B-1728B52AA6E4}">
-                <adec:decorative xmlns:adec="http://schemas.microsoft.com/office/drawing/2017/decorative" val="1"/>
-              </a:ext>
-            </a:extLst>
-          </p:cNvPr>
-          <p:cNvSpPr>
-            <a:spLocks noGrp="1" noRot="1" noChangeAspect="1" noMove="1" noResize="1" noEditPoints="1" noAdjustHandles="1" noChangeArrowheads="1" noChangeShapeType="1" noTextEdit="1"/>
-          </p:cNvSpPr>
-          <p:nvPr>
-            <p:extLst>
-              <p:ext uri="{386F3935-93C4-4BCD-93E2-E3B085C9AB24}">
-                <p16:designElem xmlns:p16="http://schemas.microsoft.com/office/powerpoint/2015/main" val="1"/>
-              </p:ext>
-            </p:extLst>
-          </p:nvPr>
-        </p:nvSpPr>
-        <p:spPr>
-          <a:xfrm rot="5400000">
-            <a:off x="-1270325" y="3369273"/>
-            <a:ext cx="3200400" cy="152382"/>
-          </a:xfrm>
-          <a:prstGeom prst="rect">
-            <a:avLst/>
-          </a:prstGeom>
-          <a:solidFill>
-            <a:schemeClr val="accent4"/>
-          </a:solidFill>
-          <a:ln>
-            <a:noFill/>
-          </a:ln>
-        </p:spPr>
-        <p:style>
-          <a:lnRef idx="2">
-            <a:schemeClr val="accent1">
-              <a:shade val="50000"/>
-            </a:schemeClr>
-          </a:lnRef>
-          <a:fillRef idx="1">
-            <a:schemeClr val="accent1"/>
-          </a:fillRef>
-          <a:effectRef idx="0">
-            <a:schemeClr val="accent1"/>
-          </a:effectRef>
-          <a:fontRef idx="minor">
-            <a:schemeClr val="lt1"/>
-          </a:fontRef>
-        </p:style>
-        <p:txBody>
-          <a:bodyPr rtlCol="0" anchor="ctr"/>
-          <a:lstStyle/>
-          <a:p>
-            <a:pPr algn="ctr"/>
-            <a:endParaRPr lang="en-US">
-              <a:latin typeface="Avenir Book" panose="02000503020000020003" pitchFamily="2" charset="0"/>
-            </a:endParaRPr>
-          </a:p>
-        </p:txBody>
-      </p:sp>
-      <p:sp>
-        <p:nvSpPr>
-          <p:cNvPr id="19" name="Rectangle 11">
-            <a:extLst>
-              <a:ext uri="{FF2B5EF4-FFF2-40B4-BE49-F238E27FC236}">
-                <a16:creationId xmlns:a16="http://schemas.microsoft.com/office/drawing/2014/main" id="{2CEF98E4-3709-4952-8F42-2305CCE34FA3}"/>
-              </a:ext>
-              <a:ext uri="{C183D7F6-B498-43B3-948B-1728B52AA6E4}">
-                <adec:decorative xmlns:adec="http://schemas.microsoft.com/office/drawing/2017/decorative" val="1"/>
-              </a:ext>
-            </a:extLst>
-          </p:cNvPr>
-          <p:cNvSpPr>
-            <a:spLocks noGrp="1" noRot="1" noChangeAspect="1" noMove="1" noResize="1" noEditPoints="1" noAdjustHandles="1" noChangeArrowheads="1" noChangeShapeType="1" noTextEdit="1"/>
-          </p:cNvSpPr>
-          <p:nvPr>
-            <p:extLst>
-              <p:ext uri="{386F3935-93C4-4BCD-93E2-E3B085C9AB24}">
-                <p16:designElem xmlns:p16="http://schemas.microsoft.com/office/powerpoint/2015/main" val="1"/>
-              </p:ext>
-            </p:extLst>
-          </p:nvPr>
-        </p:nvSpPr>
-        <p:spPr>
-          <a:xfrm rot="16200000">
-            <a:off x="6374475" y="1040470"/>
-            <a:ext cx="6858003" cy="4777047"/>
-          </a:xfrm>
-          <a:prstGeom prst="rect">
-            <a:avLst/>
-          </a:prstGeom>
-          <a:solidFill>
-            <a:schemeClr val="accent4"/>
-          </a:solidFill>
-          <a:ln>
-            <a:noFill/>
-          </a:ln>
-        </p:spPr>
-        <p:style>
-          <a:lnRef idx="2">
-            <a:schemeClr val="accent1">
-              <a:shade val="50000"/>
-            </a:schemeClr>
-          </a:lnRef>
-          <a:fillRef idx="1">
-            <a:schemeClr val="accent1"/>
-          </a:fillRef>
-          <a:effectRef idx="0">
-            <a:schemeClr val="accent1"/>
-          </a:effectRef>
-          <a:fontRef idx="minor">
-            <a:schemeClr val="lt1"/>
-          </a:fontRef>
-        </p:style>
-        <p:txBody>
-          <a:bodyPr rtlCol="0" anchor="ctr"/>
-          <a:lstStyle/>
-          <a:p>
-            <a:pPr algn="ctr"/>
-            <a:endParaRPr lang="en-US">
-              <a:latin typeface="Avenir Book" panose="02000503020000020003" pitchFamily="2" charset="0"/>
-            </a:endParaRPr>
-          </a:p>
-        </p:txBody>
-      </p:sp>
-      <p:sp>
-        <p:nvSpPr>
-          <p:cNvPr id="20" name="Rectangle 13">
-            <a:extLst>
-              <a:ext uri="{FF2B5EF4-FFF2-40B4-BE49-F238E27FC236}">
-                <a16:creationId xmlns:a16="http://schemas.microsoft.com/office/drawing/2014/main" id="{F10BCCF5-D685-47FF-B675-647EAEB72C8E}"/>
-              </a:ext>
-              <a:ext uri="{C183D7F6-B498-43B3-948B-1728B52AA6E4}">
-                <adec:decorative xmlns:adec="http://schemas.microsoft.com/office/drawing/2017/decorative" val="1"/>
-              </a:ext>
-            </a:extLst>
-          </p:cNvPr>
-          <p:cNvSpPr>
-            <a:spLocks noGrp="1" noRot="1" noChangeAspect="1" noMove="1" noResize="1" noEditPoints="1" noAdjustHandles="1" noChangeArrowheads="1" noChangeShapeType="1" noTextEdit="1"/>
-          </p:cNvSpPr>
-          <p:nvPr>
-            <p:extLst>
-              <p:ext uri="{386F3935-93C4-4BCD-93E2-E3B085C9AB24}">
-                <p16:designElem xmlns:p16="http://schemas.microsoft.com/office/powerpoint/2015/main" val="1"/>
-              </p:ext>
-            </p:extLst>
-          </p:nvPr>
-        </p:nvSpPr>
-        <p:spPr>
-          <a:xfrm>
-            <a:off x="387914" y="857786"/>
-            <a:ext cx="11067024" cy="5208932"/>
-          </a:xfrm>
-          <a:prstGeom prst="rect">
-            <a:avLst/>
-          </a:prstGeom>
-          <a:solidFill>
-            <a:schemeClr val="bg1"/>
-          </a:solidFill>
-          <a:ln>
-            <a:noFill/>
-          </a:ln>
-          <a:effectLst>
-            <a:outerShdw blurRad="139700" dist="127000" dir="5400000" algn="t" rotWithShape="0">
-              <a:prstClr val="black">
-                <a:alpha val="15000"/>
-              </a:prstClr>
-            </a:outerShdw>
-          </a:effectLst>
-        </p:spPr>
-        <p:style>
-          <a:lnRef idx="2">
-            <a:schemeClr val="accent1">
-              <a:shade val="50000"/>
-            </a:schemeClr>
-          </a:lnRef>
-          <a:fillRef idx="1">
-            <a:schemeClr val="accent1"/>
-          </a:fillRef>
-          <a:effectRef idx="0">
-            <a:schemeClr val="accent1"/>
-          </a:effectRef>
-          <a:fontRef idx="minor">
-            <a:schemeClr val="lt1"/>
-          </a:fontRef>
-        </p:style>
-        <p:txBody>
-          <a:bodyPr rtlCol="0" anchor="ctr"/>
-          <a:lstStyle/>
-          <a:p>
-            <a:pPr algn="ctr"/>
-            <a:endParaRPr lang="en-US">
-              <a:latin typeface="Avenir Book" panose="02000503020000020003" pitchFamily="2" charset="0"/>
-            </a:endParaRPr>
-          </a:p>
-        </p:txBody>
-      </p:sp>
-      <p:sp>
-        <p:nvSpPr>
-          <p:cNvPr id="2" name="Title 1">
-            <a:extLst>
-              <a:ext uri="{FF2B5EF4-FFF2-40B4-BE49-F238E27FC236}">
-                <a16:creationId xmlns:a16="http://schemas.microsoft.com/office/drawing/2014/main" id="{D311D184-299F-4749-B6FA-63D30057CBD2}"/>
-              </a:ext>
-            </a:extLst>
-          </p:cNvPr>
-          <p:cNvSpPr>
-            <a:spLocks noGrp="1"/>
-          </p:cNvSpPr>
-          <p:nvPr>
-            <p:ph type="title"/>
-          </p:nvPr>
-        </p:nvSpPr>
-        <p:spPr>
-          <a:xfrm>
-            <a:off x="659750" y="4539441"/>
-            <a:ext cx="9910296" cy="1281734"/>
-          </a:xfrm>
-        </p:spPr>
-        <p:txBody>
-          <a:bodyPr vert="horz" lIns="91440" tIns="45720" rIns="91440" bIns="45720" rtlCol="0" anchor="t">
-            <a:normAutofit/>
-          </a:bodyPr>
-          <a:lstStyle/>
-          <a:p>
-            <a:r>
-              <a:rPr lang="en-US" sz="8000" kern="1200">
-                <a:solidFill>
-                  <a:schemeClr val="tx1"/>
-                </a:solidFill>
-                <a:ea typeface="+mj-ea"/>
-                <a:cs typeface="+mj-cs"/>
-              </a:rPr>
-              <a:t>References:</a:t>
-            </a:r>
-          </a:p>
-        </p:txBody>
-      </p:sp>
-      <p:sp>
-        <p:nvSpPr>
-          <p:cNvPr id="3" name="Content Placeholder 2">
-            <a:extLst>
-              <a:ext uri="{FF2B5EF4-FFF2-40B4-BE49-F238E27FC236}">
-                <a16:creationId xmlns:a16="http://schemas.microsoft.com/office/drawing/2014/main" id="{1ACB774A-001C-434C-BDDA-4B33A0AD54D1}"/>
-              </a:ext>
-            </a:extLst>
-          </p:cNvPr>
-          <p:cNvSpPr>
-            <a:spLocks noGrp="1"/>
-          </p:cNvSpPr>
-          <p:nvPr>
-            <p:ph idx="1"/>
-          </p:nvPr>
-        </p:nvSpPr>
-        <p:spPr>
-          <a:xfrm>
-            <a:off x="987688" y="1553518"/>
-            <a:ext cx="9910295" cy="1281733"/>
-          </a:xfrm>
-        </p:spPr>
-        <p:txBody>
-          <a:bodyPr vert="horz" lIns="91440" tIns="45720" rIns="91440" bIns="45720" rtlCol="0" anchor="b">
-            <a:normAutofit fontScale="92500" lnSpcReduction="20000"/>
-          </a:bodyPr>
-          <a:lstStyle/>
-          <a:p>
-            <a:pPr marL="0" indent="0">
-              <a:lnSpc>
-                <a:spcPct val="100000"/>
-              </a:lnSpc>
-              <a:spcBef>
-                <a:spcPts val="0"/>
-              </a:spcBef>
-              <a:buNone/>
-            </a:pPr>
-            <a:r>
-              <a:rPr lang="en-US" sz="2400">
-                <a:latin typeface="Avenir Book"/>
-              </a:rPr>
-              <a:t>Centers for Medicare &amp; Medicaid Services (September 22, 2020). </a:t>
-            </a:r>
-            <a:r>
-              <a:rPr lang="en-US" sz="2400" i="1">
-                <a:latin typeface="Avenir Book"/>
-              </a:rPr>
-              <a:t>DATA USER’S GUIDE: PUBLIC USE FILE</a:t>
-            </a:r>
-            <a:r>
-              <a:rPr lang="en-US" sz="2400">
-                <a:latin typeface="Avenir Book"/>
-              </a:rPr>
-              <a:t>. </a:t>
-            </a:r>
-          </a:p>
-          <a:p>
-            <a:pPr marL="0" indent="0">
-              <a:lnSpc>
-                <a:spcPct val="100000"/>
-              </a:lnSpc>
-              <a:spcBef>
-                <a:spcPts val="0"/>
-              </a:spcBef>
-              <a:buNone/>
-            </a:pPr>
-            <a:r>
-              <a:rPr lang="en-US" sz="2400">
-                <a:latin typeface="Avenir Book"/>
-                <a:hlinkClick r:id="rId3"/>
-              </a:rPr>
-              <a:t>https://www.medicare.gov/what-medicare-covers/your-medicare-coverage-choices/whats-medicare</a:t>
-            </a:r>
-            <a:endParaRPr lang="en-US">
-              <a:ea typeface="+mn-ea"/>
-              <a:cs typeface="+mn-cs"/>
-            </a:endParaRPr>
-          </a:p>
-        </p:txBody>
-      </p:sp>
-      <p:sp>
-        <p:nvSpPr>
-          <p:cNvPr id="16" name="Rectangle 15">
-            <a:extLst>
-              <a:ext uri="{FF2B5EF4-FFF2-40B4-BE49-F238E27FC236}">
-                <a16:creationId xmlns:a16="http://schemas.microsoft.com/office/drawing/2014/main" id="{B0EE8A42-107A-4D4C-8D56-BBAE95C7FC0D}"/>
-              </a:ext>
-              <a:ext uri="{C183D7F6-B498-43B3-948B-1728B52AA6E4}">
-                <adec:decorative xmlns:adec="http://schemas.microsoft.com/office/drawing/2017/decorative" val="1"/>
-              </a:ext>
-            </a:extLst>
-          </p:cNvPr>
-          <p:cNvSpPr>
-            <a:spLocks noGrp="1" noRot="1" noChangeAspect="1" noMove="1" noResize="1" noEditPoints="1" noAdjustHandles="1" noChangeArrowheads="1" noChangeShapeType="1" noTextEdit="1"/>
-          </p:cNvSpPr>
-          <p:nvPr>
-            <p:extLst>
-              <p:ext uri="{386F3935-93C4-4BCD-93E2-E3B085C9AB24}">
-                <p16:designElem xmlns:p16="http://schemas.microsoft.com/office/powerpoint/2015/main" val="1"/>
-              </p:ext>
-            </p:extLst>
-          </p:nvPr>
-        </p:nvSpPr>
-        <p:spPr>
-          <a:xfrm rot="5400000">
-            <a:off x="-1524009" y="3366125"/>
-            <a:ext cx="3200400" cy="152382"/>
-          </a:xfrm>
-          <a:prstGeom prst="rect">
-            <a:avLst/>
-          </a:prstGeom>
-          <a:solidFill>
-            <a:schemeClr val="accent4"/>
-          </a:solidFill>
-          <a:ln>
-            <a:noFill/>
-          </a:ln>
-        </p:spPr>
-        <p:style>
-          <a:lnRef idx="2">
-            <a:schemeClr val="accent1">
-              <a:shade val="50000"/>
-            </a:schemeClr>
-          </a:lnRef>
-          <a:fillRef idx="1">
-            <a:schemeClr val="accent1"/>
-          </a:fillRef>
-          <a:effectRef idx="0">
-            <a:schemeClr val="accent1"/>
-          </a:effectRef>
-          <a:fontRef idx="minor">
-            <a:schemeClr val="lt1"/>
-          </a:fontRef>
-        </p:style>
-        <p:txBody>
-          <a:bodyPr rtlCol="0" anchor="ctr"/>
-          <a:lstStyle/>
-          <a:p>
-            <a:pPr algn="ctr"/>
-            <a:endParaRPr lang="en-US">
-              <a:latin typeface="Avenir Book" panose="02000503020000020003" pitchFamily="2" charset="0"/>
-            </a:endParaRPr>
-          </a:p>
-        </p:txBody>
-      </p:sp>
-    </p:spTree>
-    <p:extLst>
-      <p:ext uri="{BB962C8B-B14F-4D97-AF65-F5344CB8AC3E}">
-        <p14:creationId xmlns:p14="http://schemas.microsoft.com/office/powerpoint/2010/main" val="488172068"/>
       </p:ext>
     </p:extLst>
   </p:cSld>
@@ -11328,6 +11020,494 @@
       </p:par>
     </p:tnLst>
   </p:timing>
+</p:sld>
+</file>
+
+<file path=ppt/slides/slide20.xml><?xml version="1.0" encoding="utf-8"?>
+<p:sld xmlns:a="http://schemas.openxmlformats.org/drawingml/2006/main" xmlns:r="http://schemas.openxmlformats.org/officeDocument/2006/relationships" xmlns:p="http://schemas.openxmlformats.org/presentationml/2006/main">
+  <p:cSld>
+    <p:bg>
+      <p:bgPr>
+        <a:solidFill>
+          <a:schemeClr val="bg1"/>
+        </a:solidFill>
+        <a:effectLst/>
+      </p:bgPr>
+    </p:bg>
+    <p:spTree>
+      <p:nvGrpSpPr>
+        <p:cNvPr id="1" name=""/>
+        <p:cNvGrpSpPr/>
+        <p:nvPr/>
+      </p:nvGrpSpPr>
+      <p:grpSpPr>
+        <a:xfrm>
+          <a:off x="0" y="0"/>
+          <a:ext cx="0" cy="0"/>
+          <a:chOff x="0" y="0"/>
+          <a:chExt cx="0" cy="0"/>
+        </a:xfrm>
+      </p:grpSpPr>
+      <p:sp useBgFill="1">
+        <p:nvSpPr>
+          <p:cNvPr id="17" name="Rectangle 7">
+            <a:extLst>
+              <a:ext uri="{FF2B5EF4-FFF2-40B4-BE49-F238E27FC236}">
+                <a16:creationId xmlns:a16="http://schemas.microsoft.com/office/drawing/2014/main" id="{A7895A40-19A4-42D6-9D30-DBC1E8002635}"/>
+              </a:ext>
+              <a:ext uri="{C183D7F6-B498-43B3-948B-1728B52AA6E4}">
+                <adec:decorative xmlns:adec="http://schemas.microsoft.com/office/drawing/2017/decorative" val="1"/>
+              </a:ext>
+            </a:extLst>
+          </p:cNvPr>
+          <p:cNvSpPr>
+            <a:spLocks noGrp="1" noRot="1" noChangeAspect="1" noMove="1" noResize="1" noEditPoints="1" noAdjustHandles="1" noChangeArrowheads="1" noChangeShapeType="1" noTextEdit="1"/>
+          </p:cNvSpPr>
+          <p:nvPr>
+            <p:extLst>
+              <p:ext uri="{386F3935-93C4-4BCD-93E2-E3B085C9AB24}">
+                <p16:designElem xmlns:p16="http://schemas.microsoft.com/office/powerpoint/2015/main" val="1"/>
+              </p:ext>
+            </p:extLst>
+          </p:nvPr>
+        </p:nvSpPr>
+        <p:spPr>
+          <a:xfrm>
+            <a:off x="0" y="0"/>
+            <a:ext cx="12191999" cy="6857365"/>
+          </a:xfrm>
+          <a:prstGeom prst="rect">
+            <a:avLst/>
+          </a:prstGeom>
+          <a:ln>
+            <a:noFill/>
+          </a:ln>
+        </p:spPr>
+        <p:style>
+          <a:lnRef idx="2">
+            <a:schemeClr val="accent1">
+              <a:shade val="50000"/>
+            </a:schemeClr>
+          </a:lnRef>
+          <a:fillRef idx="1">
+            <a:schemeClr val="accent1"/>
+          </a:fillRef>
+          <a:effectRef idx="0">
+            <a:schemeClr val="accent1"/>
+          </a:effectRef>
+          <a:fontRef idx="minor">
+            <a:schemeClr val="lt1"/>
+          </a:fontRef>
+        </p:style>
+        <p:txBody>
+          <a:bodyPr rtlCol="0" anchor="ctr"/>
+          <a:lstStyle/>
+          <a:p>
+            <a:pPr algn="ctr"/>
+            <a:endParaRPr lang="en-US">
+              <a:latin typeface="Avenir Book" panose="02000503020000020003" pitchFamily="2" charset="0"/>
+            </a:endParaRPr>
+          </a:p>
+        </p:txBody>
+      </p:sp>
+      <p:sp>
+        <p:nvSpPr>
+          <p:cNvPr id="18" name="Rectangle 9">
+            <a:extLst>
+              <a:ext uri="{FF2B5EF4-FFF2-40B4-BE49-F238E27FC236}">
+                <a16:creationId xmlns:a16="http://schemas.microsoft.com/office/drawing/2014/main" id="{02F429C4-ABC9-46FC-818A-B5429CDE4A96}"/>
+              </a:ext>
+              <a:ext uri="{C183D7F6-B498-43B3-948B-1728B52AA6E4}">
+                <adec:decorative xmlns:adec="http://schemas.microsoft.com/office/drawing/2017/decorative" val="1"/>
+              </a:ext>
+            </a:extLst>
+          </p:cNvPr>
+          <p:cNvSpPr>
+            <a:spLocks noGrp="1" noRot="1" noChangeAspect="1" noMove="1" noResize="1" noEditPoints="1" noAdjustHandles="1" noChangeArrowheads="1" noChangeShapeType="1" noTextEdit="1"/>
+          </p:cNvSpPr>
+          <p:nvPr>
+            <p:extLst>
+              <p:ext uri="{386F3935-93C4-4BCD-93E2-E3B085C9AB24}">
+                <p16:designElem xmlns:p16="http://schemas.microsoft.com/office/powerpoint/2015/main" val="1"/>
+              </p:ext>
+            </p:extLst>
+          </p:nvPr>
+        </p:nvSpPr>
+        <p:spPr>
+          <a:xfrm rot="5400000">
+            <a:off x="-1270325" y="3369273"/>
+            <a:ext cx="3200400" cy="152382"/>
+          </a:xfrm>
+          <a:prstGeom prst="rect">
+            <a:avLst/>
+          </a:prstGeom>
+          <a:solidFill>
+            <a:schemeClr val="accent4"/>
+          </a:solidFill>
+          <a:ln>
+            <a:noFill/>
+          </a:ln>
+        </p:spPr>
+        <p:style>
+          <a:lnRef idx="2">
+            <a:schemeClr val="accent1">
+              <a:shade val="50000"/>
+            </a:schemeClr>
+          </a:lnRef>
+          <a:fillRef idx="1">
+            <a:schemeClr val="accent1"/>
+          </a:fillRef>
+          <a:effectRef idx="0">
+            <a:schemeClr val="accent1"/>
+          </a:effectRef>
+          <a:fontRef idx="minor">
+            <a:schemeClr val="lt1"/>
+          </a:fontRef>
+        </p:style>
+        <p:txBody>
+          <a:bodyPr rtlCol="0" anchor="ctr"/>
+          <a:lstStyle/>
+          <a:p>
+            <a:pPr algn="ctr"/>
+            <a:endParaRPr lang="en-US">
+              <a:latin typeface="Avenir Book" panose="02000503020000020003" pitchFamily="2" charset="0"/>
+            </a:endParaRPr>
+          </a:p>
+        </p:txBody>
+      </p:sp>
+      <p:sp>
+        <p:nvSpPr>
+          <p:cNvPr id="19" name="Rectangle 11">
+            <a:extLst>
+              <a:ext uri="{FF2B5EF4-FFF2-40B4-BE49-F238E27FC236}">
+                <a16:creationId xmlns:a16="http://schemas.microsoft.com/office/drawing/2014/main" id="{2CEF98E4-3709-4952-8F42-2305CCE34FA3}"/>
+              </a:ext>
+              <a:ext uri="{C183D7F6-B498-43B3-948B-1728B52AA6E4}">
+                <adec:decorative xmlns:adec="http://schemas.microsoft.com/office/drawing/2017/decorative" val="1"/>
+              </a:ext>
+            </a:extLst>
+          </p:cNvPr>
+          <p:cNvSpPr>
+            <a:spLocks noGrp="1" noRot="1" noChangeAspect="1" noMove="1" noResize="1" noEditPoints="1" noAdjustHandles="1" noChangeArrowheads="1" noChangeShapeType="1" noTextEdit="1"/>
+          </p:cNvSpPr>
+          <p:nvPr>
+            <p:extLst>
+              <p:ext uri="{386F3935-93C4-4BCD-93E2-E3B085C9AB24}">
+                <p16:designElem xmlns:p16="http://schemas.microsoft.com/office/powerpoint/2015/main" val="1"/>
+              </p:ext>
+            </p:extLst>
+          </p:nvPr>
+        </p:nvSpPr>
+        <p:spPr>
+          <a:xfrm rot="16200000">
+            <a:off x="6374475" y="1040470"/>
+            <a:ext cx="6858003" cy="4777047"/>
+          </a:xfrm>
+          <a:prstGeom prst="rect">
+            <a:avLst/>
+          </a:prstGeom>
+          <a:solidFill>
+            <a:schemeClr val="accent4"/>
+          </a:solidFill>
+          <a:ln>
+            <a:noFill/>
+          </a:ln>
+        </p:spPr>
+        <p:style>
+          <a:lnRef idx="2">
+            <a:schemeClr val="accent1">
+              <a:shade val="50000"/>
+            </a:schemeClr>
+          </a:lnRef>
+          <a:fillRef idx="1">
+            <a:schemeClr val="accent1"/>
+          </a:fillRef>
+          <a:effectRef idx="0">
+            <a:schemeClr val="accent1"/>
+          </a:effectRef>
+          <a:fontRef idx="minor">
+            <a:schemeClr val="lt1"/>
+          </a:fontRef>
+        </p:style>
+        <p:txBody>
+          <a:bodyPr rtlCol="0" anchor="ctr"/>
+          <a:lstStyle/>
+          <a:p>
+            <a:pPr algn="ctr"/>
+            <a:endParaRPr lang="en-US">
+              <a:latin typeface="Avenir Book" panose="02000503020000020003" pitchFamily="2" charset="0"/>
+            </a:endParaRPr>
+          </a:p>
+        </p:txBody>
+      </p:sp>
+      <p:sp>
+        <p:nvSpPr>
+          <p:cNvPr id="20" name="Rectangle 13">
+            <a:extLst>
+              <a:ext uri="{FF2B5EF4-FFF2-40B4-BE49-F238E27FC236}">
+                <a16:creationId xmlns:a16="http://schemas.microsoft.com/office/drawing/2014/main" id="{F10BCCF5-D685-47FF-B675-647EAEB72C8E}"/>
+              </a:ext>
+              <a:ext uri="{C183D7F6-B498-43B3-948B-1728B52AA6E4}">
+                <adec:decorative xmlns:adec="http://schemas.microsoft.com/office/drawing/2017/decorative" val="1"/>
+              </a:ext>
+            </a:extLst>
+          </p:cNvPr>
+          <p:cNvSpPr>
+            <a:spLocks noGrp="1" noRot="1" noChangeAspect="1" noMove="1" noResize="1" noEditPoints="1" noAdjustHandles="1" noChangeArrowheads="1" noChangeShapeType="1" noTextEdit="1"/>
+          </p:cNvSpPr>
+          <p:nvPr>
+            <p:extLst>
+              <p:ext uri="{386F3935-93C4-4BCD-93E2-E3B085C9AB24}">
+                <p16:designElem xmlns:p16="http://schemas.microsoft.com/office/powerpoint/2015/main" val="1"/>
+              </p:ext>
+            </p:extLst>
+          </p:nvPr>
+        </p:nvSpPr>
+        <p:spPr>
+          <a:xfrm>
+            <a:off x="387914" y="857786"/>
+            <a:ext cx="11067024" cy="5208932"/>
+          </a:xfrm>
+          <a:prstGeom prst="rect">
+            <a:avLst/>
+          </a:prstGeom>
+          <a:solidFill>
+            <a:schemeClr val="bg1"/>
+          </a:solidFill>
+          <a:ln>
+            <a:noFill/>
+          </a:ln>
+          <a:effectLst>
+            <a:outerShdw blurRad="139700" dist="127000" dir="5400000" algn="t" rotWithShape="0">
+              <a:prstClr val="black">
+                <a:alpha val="15000"/>
+              </a:prstClr>
+            </a:outerShdw>
+          </a:effectLst>
+        </p:spPr>
+        <p:style>
+          <a:lnRef idx="2">
+            <a:schemeClr val="accent1">
+              <a:shade val="50000"/>
+            </a:schemeClr>
+          </a:lnRef>
+          <a:fillRef idx="1">
+            <a:schemeClr val="accent1"/>
+          </a:fillRef>
+          <a:effectRef idx="0">
+            <a:schemeClr val="accent1"/>
+          </a:effectRef>
+          <a:fontRef idx="minor">
+            <a:schemeClr val="lt1"/>
+          </a:fontRef>
+        </p:style>
+        <p:txBody>
+          <a:bodyPr rtlCol="0" anchor="ctr"/>
+          <a:lstStyle/>
+          <a:p>
+            <a:pPr algn="ctr"/>
+            <a:endParaRPr lang="en-US">
+              <a:latin typeface="Avenir Book" panose="02000503020000020003" pitchFamily="2" charset="0"/>
+            </a:endParaRPr>
+          </a:p>
+        </p:txBody>
+      </p:sp>
+      <p:sp>
+        <p:nvSpPr>
+          <p:cNvPr id="2" name="Title 1">
+            <a:extLst>
+              <a:ext uri="{FF2B5EF4-FFF2-40B4-BE49-F238E27FC236}">
+                <a16:creationId xmlns:a16="http://schemas.microsoft.com/office/drawing/2014/main" id="{D311D184-299F-4749-B6FA-63D30057CBD2}"/>
+              </a:ext>
+            </a:extLst>
+          </p:cNvPr>
+          <p:cNvSpPr>
+            <a:spLocks noGrp="1"/>
+          </p:cNvSpPr>
+          <p:nvPr>
+            <p:ph type="title"/>
+          </p:nvPr>
+        </p:nvSpPr>
+        <p:spPr>
+          <a:xfrm>
+            <a:off x="659750" y="4539441"/>
+            <a:ext cx="9910296" cy="1281734"/>
+          </a:xfrm>
+        </p:spPr>
+        <p:txBody>
+          <a:bodyPr vert="horz" lIns="91440" tIns="45720" rIns="91440" bIns="45720" rtlCol="0" anchor="t">
+            <a:normAutofit/>
+          </a:bodyPr>
+          <a:lstStyle/>
+          <a:p>
+            <a:r>
+              <a:rPr lang="en-US" sz="8000" kern="1200">
+                <a:solidFill>
+                  <a:schemeClr val="tx1"/>
+                </a:solidFill>
+                <a:ea typeface="+mj-ea"/>
+                <a:cs typeface="+mj-cs"/>
+              </a:rPr>
+              <a:t>References:</a:t>
+            </a:r>
+          </a:p>
+        </p:txBody>
+      </p:sp>
+      <p:sp>
+        <p:nvSpPr>
+          <p:cNvPr id="3" name="Content Placeholder 2">
+            <a:extLst>
+              <a:ext uri="{FF2B5EF4-FFF2-40B4-BE49-F238E27FC236}">
+                <a16:creationId xmlns:a16="http://schemas.microsoft.com/office/drawing/2014/main" id="{1ACB774A-001C-434C-BDDA-4B33A0AD54D1}"/>
+              </a:ext>
+            </a:extLst>
+          </p:cNvPr>
+          <p:cNvSpPr>
+            <a:spLocks noGrp="1"/>
+          </p:cNvSpPr>
+          <p:nvPr>
+            <p:ph idx="1"/>
+          </p:nvPr>
+        </p:nvSpPr>
+        <p:spPr>
+          <a:xfrm>
+            <a:off x="987688" y="1553518"/>
+            <a:ext cx="9910295" cy="1281733"/>
+          </a:xfrm>
+        </p:spPr>
+        <p:txBody>
+          <a:bodyPr vert="horz" lIns="91440" tIns="45720" rIns="91440" bIns="45720" rtlCol="0" anchor="b">
+            <a:normAutofit fontScale="92500" lnSpcReduction="20000"/>
+          </a:bodyPr>
+          <a:lstStyle/>
+          <a:p>
+            <a:pPr marL="0" indent="0">
+              <a:lnSpc>
+                <a:spcPct val="100000"/>
+              </a:lnSpc>
+              <a:spcBef>
+                <a:spcPts val="0"/>
+              </a:spcBef>
+              <a:buNone/>
+            </a:pPr>
+            <a:r>
+              <a:rPr lang="en-US" sz="2400">
+                <a:latin typeface="Avenir Book"/>
+              </a:rPr>
+              <a:t>Centers for Medicare &amp; Medicaid Services (September 22, 2020). </a:t>
+            </a:r>
+            <a:r>
+              <a:rPr lang="en-US" sz="2400" i="1">
+                <a:latin typeface="Avenir Book"/>
+              </a:rPr>
+              <a:t>DATA USER’S GUIDE: PUBLIC USE FILE</a:t>
+            </a:r>
+            <a:r>
+              <a:rPr lang="en-US" sz="2400">
+                <a:latin typeface="Avenir Book"/>
+              </a:rPr>
+              <a:t>. </a:t>
+            </a:r>
+          </a:p>
+          <a:p>
+            <a:pPr marL="0" indent="0">
+              <a:lnSpc>
+                <a:spcPct val="100000"/>
+              </a:lnSpc>
+              <a:spcBef>
+                <a:spcPts val="0"/>
+              </a:spcBef>
+              <a:buNone/>
+            </a:pPr>
+            <a:r>
+              <a:rPr lang="en-US" sz="2400">
+                <a:latin typeface="Avenir Book"/>
+                <a:hlinkClick r:id="rId3"/>
+              </a:rPr>
+              <a:t>https://www.medicare.gov/what-medicare-covers/your-medicare-coverage-choices/whats-medicare</a:t>
+            </a:r>
+            <a:endParaRPr lang="en-US">
+              <a:ea typeface="+mn-ea"/>
+              <a:cs typeface="+mn-cs"/>
+            </a:endParaRPr>
+          </a:p>
+        </p:txBody>
+      </p:sp>
+      <p:sp>
+        <p:nvSpPr>
+          <p:cNvPr id="16" name="Rectangle 15">
+            <a:extLst>
+              <a:ext uri="{FF2B5EF4-FFF2-40B4-BE49-F238E27FC236}">
+                <a16:creationId xmlns:a16="http://schemas.microsoft.com/office/drawing/2014/main" id="{B0EE8A42-107A-4D4C-8D56-BBAE95C7FC0D}"/>
+              </a:ext>
+              <a:ext uri="{C183D7F6-B498-43B3-948B-1728B52AA6E4}">
+                <adec:decorative xmlns:adec="http://schemas.microsoft.com/office/drawing/2017/decorative" val="1"/>
+              </a:ext>
+            </a:extLst>
+          </p:cNvPr>
+          <p:cNvSpPr>
+            <a:spLocks noGrp="1" noRot="1" noChangeAspect="1" noMove="1" noResize="1" noEditPoints="1" noAdjustHandles="1" noChangeArrowheads="1" noChangeShapeType="1" noTextEdit="1"/>
+          </p:cNvSpPr>
+          <p:nvPr>
+            <p:extLst>
+              <p:ext uri="{386F3935-93C4-4BCD-93E2-E3B085C9AB24}">
+                <p16:designElem xmlns:p16="http://schemas.microsoft.com/office/powerpoint/2015/main" val="1"/>
+              </p:ext>
+            </p:extLst>
+          </p:nvPr>
+        </p:nvSpPr>
+        <p:spPr>
+          <a:xfrm rot="5400000">
+            <a:off x="-1524009" y="3366125"/>
+            <a:ext cx="3200400" cy="152382"/>
+          </a:xfrm>
+          <a:prstGeom prst="rect">
+            <a:avLst/>
+          </a:prstGeom>
+          <a:solidFill>
+            <a:schemeClr val="accent4"/>
+          </a:solidFill>
+          <a:ln>
+            <a:noFill/>
+          </a:ln>
+        </p:spPr>
+        <p:style>
+          <a:lnRef idx="2">
+            <a:schemeClr val="accent1">
+              <a:shade val="50000"/>
+            </a:schemeClr>
+          </a:lnRef>
+          <a:fillRef idx="1">
+            <a:schemeClr val="accent1"/>
+          </a:fillRef>
+          <a:effectRef idx="0">
+            <a:schemeClr val="accent1"/>
+          </a:effectRef>
+          <a:fontRef idx="minor">
+            <a:schemeClr val="lt1"/>
+          </a:fontRef>
+        </p:style>
+        <p:txBody>
+          <a:bodyPr rtlCol="0" anchor="ctr"/>
+          <a:lstStyle/>
+          <a:p>
+            <a:pPr algn="ctr"/>
+            <a:endParaRPr lang="en-US">
+              <a:latin typeface="Avenir Book" panose="02000503020000020003" pitchFamily="2" charset="0"/>
+            </a:endParaRPr>
+          </a:p>
+        </p:txBody>
+      </p:sp>
+    </p:spTree>
+    <p:extLst>
+      <p:ext uri="{BB962C8B-B14F-4D97-AF65-F5344CB8AC3E}">
+        <p14:creationId xmlns:p14="http://schemas.microsoft.com/office/powerpoint/2010/main" val="488172068"/>
+      </p:ext>
+    </p:extLst>
+  </p:cSld>
+  <p:clrMapOvr>
+    <a:masterClrMapping/>
+  </p:clrMapOvr>
 </p:sld>
 </file>
 
@@ -13388,8 +13568,8 @@
         </p:blipFill>
         <p:spPr>
           <a:xfrm>
-            <a:off x="0" y="5232400"/>
-            <a:ext cx="4457700" cy="1625600"/>
+            <a:off x="0" y="6231156"/>
+            <a:ext cx="1718921" cy="626843"/>
           </a:xfrm>
           <a:prstGeom prst="rect">
             <a:avLst/>
@@ -13454,6 +13634,47 @@
             <a:r>
               <a:rPr lang="en-US" dirty="0"/>
               <a:t>Total #</a:t>
+            </a:r>
+          </a:p>
+        </p:txBody>
+      </p:sp>
+      <p:sp>
+        <p:nvSpPr>
+          <p:cNvPr id="3" name="TextBox 2">
+            <a:extLst>
+              <a:ext uri="{FF2B5EF4-FFF2-40B4-BE49-F238E27FC236}">
+                <a16:creationId xmlns:a16="http://schemas.microsoft.com/office/drawing/2014/main" id="{974FA245-DF8C-9247-BEF6-3A1D72E0116E}"/>
+              </a:ext>
+            </a:extLst>
+          </p:cNvPr>
+          <p:cNvSpPr txBox="1"/>
+          <p:nvPr/>
+        </p:nvSpPr>
+        <p:spPr>
+          <a:xfrm>
+            <a:off x="3291147" y="1664591"/>
+            <a:ext cx="5101739" cy="923330"/>
+          </a:xfrm>
+          <a:prstGeom prst="rect">
+            <a:avLst/>
+          </a:prstGeom>
+          <a:noFill/>
+        </p:spPr>
+        <p:txBody>
+          <a:bodyPr wrap="square" rtlCol="0">
+            <a:spAutoFit/>
+          </a:bodyPr>
+          <a:lstStyle/>
+          <a:p>
+            <a:r>
+              <a:rPr lang="en-US" dirty="0"/>
+              <a:t>ACC_HCDELAY: Last year ever delay in care due to cost</a:t>
+            </a:r>
+          </a:p>
+          <a:p>
+            <a:r>
+              <a:rPr lang="en-US" dirty="0"/>
+              <a:t>ACC_PAYPROB: Problem paying medical bills </a:t>
             </a:r>
           </a:p>
         </p:txBody>
@@ -13887,8 +14108,8 @@
         </p:blipFill>
         <p:spPr>
           <a:xfrm>
-            <a:off x="0" y="5232400"/>
-            <a:ext cx="4457700" cy="1625600"/>
+            <a:off x="0" y="6231156"/>
+            <a:ext cx="1718921" cy="626843"/>
           </a:xfrm>
           <a:prstGeom prst="rect">
             <a:avLst/>
@@ -13911,15 +14132,67 @@
             <p:ph type="subTitle" idx="1"/>
           </p:nvPr>
         </p:nvSpPr>
-        <p:spPr/>
+        <p:spPr>
+          <a:xfrm>
+            <a:off x="641774" y="1358372"/>
+            <a:ext cx="9569026" cy="3874028"/>
+          </a:xfrm>
+        </p:spPr>
         <p:txBody>
           <a:bodyPr/>
           <a:lstStyle/>
           <a:p>
-            <a:endParaRPr lang="en-US"/>
-          </a:p>
-        </p:txBody>
-      </p:sp>
+            <a:pPr marL="457200" indent="-457200" algn="just">
+              <a:buFont typeface="+mj-lt"/>
+              <a:buAutoNum type="arabicPeriod"/>
+            </a:pPr>
+            <a:r>
+              <a:rPr lang="en-US" dirty="0"/>
+              <a:t>Simplified variables</a:t>
+            </a:r>
+          </a:p>
+          <a:p>
+            <a:pPr marL="457200" indent="-457200" algn="just">
+              <a:buFont typeface="+mj-lt"/>
+              <a:buAutoNum type="arabicPeriod"/>
+            </a:pPr>
+            <a:r>
+              <a:rPr lang="en-US" dirty="0"/>
+              <a:t>Cleaning non-response</a:t>
+            </a:r>
+          </a:p>
+        </p:txBody>
+      </p:sp>
+      <p:pic>
+        <p:nvPicPr>
+          <p:cNvPr id="3" name="Picture 2">
+            <a:extLst>
+              <a:ext uri="{FF2B5EF4-FFF2-40B4-BE49-F238E27FC236}">
+                <a16:creationId xmlns:a16="http://schemas.microsoft.com/office/drawing/2014/main" id="{12344D9D-6346-8B41-86A4-819122EA92C7}"/>
+              </a:ext>
+            </a:extLst>
+          </p:cNvPr>
+          <p:cNvPicPr>
+            <a:picLocks noChangeAspect="1"/>
+          </p:cNvPicPr>
+          <p:nvPr/>
+        </p:nvPicPr>
+        <p:blipFill>
+          <a:blip r:embed="rId4"/>
+          <a:stretch>
+            <a:fillRect/>
+          </a:stretch>
+        </p:blipFill>
+        <p:spPr>
+          <a:xfrm>
+            <a:off x="791517" y="2109585"/>
+            <a:ext cx="6603403" cy="594048"/>
+          </a:xfrm>
+          <a:prstGeom prst="rect">
+            <a:avLst/>
+          </a:prstGeom>
+        </p:spPr>
+      </p:pic>
     </p:spTree>
     <p:extLst>
       <p:ext uri="{BB962C8B-B14F-4D97-AF65-F5344CB8AC3E}">

</xml_diff>